<commit_message>
more image fixes for ch 1 and 2
</commit_message>
<xml_diff>
--- a/images/experiments/src/money.pptx
+++ b/images/experiments/src/money.pptx
@@ -1523,7 +1523,7 @@
     <inkml:brush xml:id="br0">
       <inkml:brushProperty name="width" value="0.1" units="cm"/>
       <inkml:brushProperty name="height" value="0.1" units="cm"/>
-      <inkml:brushProperty name="color" value="#E71224"/>
+      <inkml:brushProperty name="color" value="#C93431"/>
     </inkml:brush>
   </inkml:definitions>
   <inkml:trace contextRef="#ctx0" brushRef="#br0">10 1 24575,'0'14'0,"0"4"0,0-2 0,-5-4 0,4 2 0,-3-9 0,4 5 0,0-1 0,0 1 0,0-1 0,0 0 0,0 0 0,0 0 0,0 0 0,0 0 0,0 0 0,0 6 0,0-4 0,0 9 0,0-4 0,0 5 0,0 1 0,0-1 0,0 0 0,0-5 0,0-1 0,0-5 0,0 0 0,4-1 0,1 0 0,4 0 0,1 1 0,0 0 0,-1-1 0,1 1 0,0 0 0,-1-1 0,-3 1 0,2-5 0,-3 0 0,5-5 0,-1 0 0,1 0 0,0 0 0,4 0 0,-3 0 0,9 0 0,-9 0 0,4 0 0,-5 0 0,5 0 0,-4 0 0,3 0 0,-4 0 0,0 0 0,-1 0 0,1 0 0,0 0 0,-1 0 0,1 0 0,-1 0 0,1 0 0,-2 0 0,1 0 0,-4-9 0,-1 3 0,-4-7 0,0-2 0,5-1 0,-4 0 0,4 1 0,-5 0 0,0 4 0,0-3 0,-4 8 0,3-2 0,-7-2 0,-3-2 0,-1-8 0,-3 3 0,5 1 0,-6-4 0,5 9 0,-4-9 0,5 9 0,0-4 0,0 6 0,1-1 0,-1 1 0,1-1 0,-1 5 0,0-4 0,1 4 0,-1-1 0,0-2 0,1 2 0,-1-3 0,0 3 0,1-2 0,-1 2 0,1 1 0,-1 1 0,5 0 0,-2 2 0,6-10 0,-3 11 0,4-7 0</inkml:trace>
@@ -8389,8 +8389,8 @@
           <a:chExt cx="0" cy="0"/>
         </a:xfrm>
       </p:grpSpPr>
-      <mc:AlternateContent xmlns:mc="http://schemas.openxmlformats.org/markup-compatibility/2006">
-        <mc:Choice xmlns:p14="http://schemas.microsoft.com/office/powerpoint/2010/main" Requires="p14">
+      <mc:AlternateContent xmlns:mc="http://schemas.openxmlformats.org/markup-compatibility/2006" xmlns:p14="http://schemas.microsoft.com/office/powerpoint/2010/main">
+        <mc:Choice Requires="p14">
           <p:contentPart p14:bwMode="auto" r:id="rId2">
             <p14:nvContentPartPr>
               <p14:cNvPr id="14" name="Ink 13">
@@ -8409,7 +8409,7 @@
             </p14:xfrm>
           </p:contentPart>
         </mc:Choice>
-        <mc:Fallback>
+        <mc:Fallback xmlns="">
           <p:pic>
             <p:nvPicPr>
               <p:cNvPr id="14" name="Ink 13">
@@ -8440,8 +8440,8 @@
           </p:pic>
         </mc:Fallback>
       </mc:AlternateContent>
-      <mc:AlternateContent xmlns:mc="http://schemas.openxmlformats.org/markup-compatibility/2006">
-        <mc:Choice xmlns:p14="http://schemas.microsoft.com/office/powerpoint/2010/main" Requires="p14">
+      <mc:AlternateContent xmlns:mc="http://schemas.openxmlformats.org/markup-compatibility/2006" xmlns:p14="http://schemas.microsoft.com/office/powerpoint/2010/main">
+        <mc:Choice Requires="p14">
           <p:contentPart p14:bwMode="auto" r:id="rId4">
             <p14:nvContentPartPr>
               <p14:cNvPr id="9" name="Ink 8">
@@ -8460,7 +8460,7 @@
             </p14:xfrm>
           </p:contentPart>
         </mc:Choice>
-        <mc:Fallback>
+        <mc:Fallback xmlns="">
           <p:pic>
             <p:nvPicPr>
               <p:cNvPr id="9" name="Ink 8">
@@ -9134,8 +9134,8 @@
           </p:pic>
         </mc:Fallback>
       </mc:AlternateContent>
-      <mc:AlternateContent xmlns:mc="http://schemas.openxmlformats.org/markup-compatibility/2006">
-        <mc:Choice xmlns:p14="http://schemas.microsoft.com/office/powerpoint/2010/main" Requires="p14">
+      <mc:AlternateContent xmlns:mc="http://schemas.openxmlformats.org/markup-compatibility/2006" xmlns:p14="http://schemas.microsoft.com/office/powerpoint/2010/main">
+        <mc:Choice Requires="p14">
           <p:contentPart p14:bwMode="auto" r:id="rId20">
             <p14:nvContentPartPr>
               <p14:cNvPr id="8" name="Ink 7">
@@ -9154,7 +9154,7 @@
             </p14:xfrm>
           </p:contentPart>
         </mc:Choice>
-        <mc:Fallback>
+        <mc:Fallback xmlns="">
           <p:pic>
             <p:nvPicPr>
               <p:cNvPr id="8" name="Ink 7">
@@ -9185,8 +9185,8 @@
           </p:pic>
         </mc:Fallback>
       </mc:AlternateContent>
-      <mc:AlternateContent xmlns:mc="http://schemas.openxmlformats.org/markup-compatibility/2006">
-        <mc:Choice xmlns:p14="http://schemas.microsoft.com/office/powerpoint/2010/main" Requires="p14">
+      <mc:AlternateContent xmlns:mc="http://schemas.openxmlformats.org/markup-compatibility/2006" xmlns:p14="http://schemas.microsoft.com/office/powerpoint/2010/main">
+        <mc:Choice Requires="p14">
           <p:contentPart p14:bwMode="auto" r:id="rId22">
             <p14:nvContentPartPr>
               <p14:cNvPr id="11" name="Ink 10">
@@ -9205,7 +9205,7 @@
             </p14:xfrm>
           </p:contentPart>
         </mc:Choice>
-        <mc:Fallback>
+        <mc:Fallback xmlns="">
           <p:pic>
             <p:nvPicPr>
               <p:cNvPr id="11" name="Ink 10">
@@ -9236,8 +9236,8 @@
           </p:pic>
         </mc:Fallback>
       </mc:AlternateContent>
-      <mc:AlternateContent xmlns:mc="http://schemas.openxmlformats.org/markup-compatibility/2006" xmlns:p14="http://schemas.microsoft.com/office/powerpoint/2010/main">
-        <mc:Choice Requires="p14">
+      <mc:AlternateContent xmlns:mc="http://schemas.openxmlformats.org/markup-compatibility/2006">
+        <mc:Choice xmlns:p14="http://schemas.microsoft.com/office/powerpoint/2010/main" Requires="p14">
           <p:contentPart p14:bwMode="auto" r:id="rId24">
             <p14:nvContentPartPr>
               <p14:cNvPr id="60" name="Ink 59">
@@ -9256,7 +9256,7 @@
             </p14:xfrm>
           </p:contentPart>
         </mc:Choice>
-        <mc:Fallback xmlns="">
+        <mc:Fallback>
           <p:pic>
             <p:nvPicPr>
               <p:cNvPr id="60" name="Ink 59">
@@ -9270,7 +9270,7 @@
               <p:nvPr/>
             </p:nvPicPr>
             <p:blipFill>
-              <a:blip r:embed="rId26"/>
+              <a:blip r:embed="rId25"/>
               <a:stretch>
                 <a:fillRect/>
               </a:stretch>
@@ -9287,9 +9287,9 @@
           </p:pic>
         </mc:Fallback>
       </mc:AlternateContent>
-      <mc:AlternateContent xmlns:mc="http://schemas.openxmlformats.org/markup-compatibility/2006">
-        <mc:Choice xmlns:p14="http://schemas.microsoft.com/office/powerpoint/2010/main" Requires="p14">
-          <p:contentPart p14:bwMode="auto" r:id="rId27">
+      <mc:AlternateContent xmlns:mc="http://schemas.openxmlformats.org/markup-compatibility/2006" xmlns:p14="http://schemas.microsoft.com/office/powerpoint/2010/main">
+        <mc:Choice Requires="p14">
+          <p:contentPart p14:bwMode="auto" r:id="rId26">
             <p14:nvContentPartPr>
               <p14:cNvPr id="13" name="Ink 12">
                 <a:extLst>
@@ -9307,7 +9307,7 @@
             </p14:xfrm>
           </p:contentPart>
         </mc:Choice>
-        <mc:Fallback>
+        <mc:Fallback xmlns="">
           <p:pic>
             <p:nvPicPr>
               <p:cNvPr id="13" name="Ink 12">
@@ -9338,8 +9338,8 @@
           </p:pic>
         </mc:Fallback>
       </mc:AlternateContent>
-      <mc:AlternateContent xmlns:mc="http://schemas.openxmlformats.org/markup-compatibility/2006">
-        <mc:Choice xmlns:p14="http://schemas.microsoft.com/office/powerpoint/2010/main" Requires="p14">
+      <mc:AlternateContent xmlns:mc="http://schemas.openxmlformats.org/markup-compatibility/2006" xmlns:p14="http://schemas.microsoft.com/office/powerpoint/2010/main">
+        <mc:Choice Requires="p14">
           <p:contentPart p14:bwMode="auto" r:id="rId29">
             <p14:nvContentPartPr>
               <p14:cNvPr id="62" name="Ink 61">
@@ -9358,7 +9358,7 @@
             </p14:xfrm>
           </p:contentPart>
         </mc:Choice>
-        <mc:Fallback>
+        <mc:Fallback xmlns="">
           <p:pic>
             <p:nvPicPr>
               <p:cNvPr id="62" name="Ink 61">
@@ -10221,7 +10221,7 @@
               <p:nvPr/>
             </p:nvPicPr>
             <p:blipFill>
-              <a:blip r:embed="rId26"/>
+              <a:blip r:embed="rId53"/>
               <a:stretch>
                 <a:fillRect/>
               </a:stretch>
@@ -10260,7 +10260,7 @@
         </p:grpSpPr>
         <mc:AlternateContent xmlns:mc="http://schemas.openxmlformats.org/markup-compatibility/2006" xmlns:p14="http://schemas.microsoft.com/office/powerpoint/2010/main">
           <mc:Choice Requires="p14">
-            <p:contentPart p14:bwMode="auto" r:id="rId53">
+            <p:contentPart p14:bwMode="auto" r:id="rId54">
               <p14:nvContentPartPr>
                 <p14:cNvPr id="67" name="Ink 66">
                   <a:extLst>
@@ -10292,7 +10292,7 @@
                 <p:nvPr/>
               </p:nvPicPr>
               <p:blipFill>
-                <a:blip r:embed="rId54"/>
+                <a:blip r:embed="rId55"/>
                 <a:stretch>
                   <a:fillRect/>
                 </a:stretch>
@@ -10311,7 +10311,7 @@
         </mc:AlternateContent>
         <mc:AlternateContent xmlns:mc="http://schemas.openxmlformats.org/markup-compatibility/2006" xmlns:p14="http://schemas.microsoft.com/office/powerpoint/2010/main">
           <mc:Choice Requires="p14">
-            <p:contentPart p14:bwMode="auto" r:id="rId55">
+            <p:contentPart p14:bwMode="auto" r:id="rId56">
               <p14:nvContentPartPr>
                 <p14:cNvPr id="68" name="Ink 67">
                   <a:extLst>
@@ -10343,7 +10343,7 @@
                 <p:nvPr/>
               </p:nvPicPr>
               <p:blipFill>
-                <a:blip r:embed="rId56"/>
+                <a:blip r:embed="rId57"/>
                 <a:stretch>
                   <a:fillRect/>
                 </a:stretch>
@@ -10362,7 +10362,7 @@
         </mc:AlternateContent>
         <mc:AlternateContent xmlns:mc="http://schemas.openxmlformats.org/markup-compatibility/2006" xmlns:p14="http://schemas.microsoft.com/office/powerpoint/2010/main">
           <mc:Choice Requires="p14">
-            <p:contentPart p14:bwMode="auto" r:id="rId57">
+            <p:contentPart p14:bwMode="auto" r:id="rId58">
               <p14:nvContentPartPr>
                 <p14:cNvPr id="69" name="Ink 68">
                   <a:extLst>
@@ -10481,8 +10481,8 @@
           <a:chExt cx="0" cy="0"/>
         </a:xfrm>
       </p:grpSpPr>
-      <mc:AlternateContent xmlns:mc="http://schemas.openxmlformats.org/markup-compatibility/2006">
-        <mc:Choice xmlns:p14="http://schemas.microsoft.com/office/powerpoint/2010/main" Requires="p14">
+      <mc:AlternateContent xmlns:mc="http://schemas.openxmlformats.org/markup-compatibility/2006" xmlns:p14="http://schemas.microsoft.com/office/powerpoint/2010/main">
+        <mc:Choice Requires="p14">
           <p:contentPart p14:bwMode="auto" r:id="rId2">
             <p14:nvContentPartPr>
               <p14:cNvPr id="9" name="Ink 8">
@@ -10501,7 +10501,7 @@
             </p14:xfrm>
           </p:contentPart>
         </mc:Choice>
-        <mc:Fallback>
+        <mc:Fallback xmlns="">
           <p:pic>
             <p:nvPicPr>
               <p:cNvPr id="9" name="Ink 8">
@@ -10532,8 +10532,8 @@
           </p:pic>
         </mc:Fallback>
       </mc:AlternateContent>
-      <mc:AlternateContent xmlns:mc="http://schemas.openxmlformats.org/markup-compatibility/2006">
-        <mc:Choice xmlns:p14="http://schemas.microsoft.com/office/powerpoint/2010/main" Requires="p14">
+      <mc:AlternateContent xmlns:mc="http://schemas.openxmlformats.org/markup-compatibility/2006" xmlns:p14="http://schemas.microsoft.com/office/powerpoint/2010/main">
+        <mc:Choice Requires="p14">
           <p:contentPart p14:bwMode="auto" r:id="rId4">
             <p14:nvContentPartPr>
               <p14:cNvPr id="14" name="Ink 13">
@@ -10552,7 +10552,7 @@
             </p14:xfrm>
           </p:contentPart>
         </mc:Choice>
-        <mc:Fallback>
+        <mc:Fallback xmlns="">
           <p:pic>
             <p:nvPicPr>
               <p:cNvPr id="14" name="Ink 13">
@@ -10583,8 +10583,8 @@
           </p:pic>
         </mc:Fallback>
       </mc:AlternateContent>
-      <mc:AlternateContent xmlns:mc="http://schemas.openxmlformats.org/markup-compatibility/2006">
-        <mc:Choice xmlns:p14="http://schemas.microsoft.com/office/powerpoint/2010/main" Requires="p14">
+      <mc:AlternateContent xmlns:mc="http://schemas.openxmlformats.org/markup-compatibility/2006" xmlns:p14="http://schemas.microsoft.com/office/powerpoint/2010/main">
+        <mc:Choice Requires="p14">
           <p:contentPart p14:bwMode="auto" r:id="rId6">
             <p14:nvContentPartPr>
               <p14:cNvPr id="67" name="Ink 66">
@@ -10603,7 +10603,7 @@
             </p14:xfrm>
           </p:contentPart>
         </mc:Choice>
-        <mc:Fallback>
+        <mc:Fallback xmlns="">
           <p:pic>
             <p:nvPicPr>
               <p:cNvPr id="67" name="Ink 66">
@@ -10634,8 +10634,8 @@
           </p:pic>
         </mc:Fallback>
       </mc:AlternateContent>
-      <mc:AlternateContent xmlns:mc="http://schemas.openxmlformats.org/markup-compatibility/2006">
-        <mc:Choice xmlns:p14="http://schemas.microsoft.com/office/powerpoint/2010/main" Requires="p14">
+      <mc:AlternateContent xmlns:mc="http://schemas.openxmlformats.org/markup-compatibility/2006" xmlns:p14="http://schemas.microsoft.com/office/powerpoint/2010/main">
+        <mc:Choice Requires="p14">
           <p:contentPart p14:bwMode="auto" r:id="rId7">
             <p14:nvContentPartPr>
               <p14:cNvPr id="61" name="Ink 60">
@@ -10654,7 +10654,7 @@
             </p14:xfrm>
           </p:contentPart>
         </mc:Choice>
-        <mc:Fallback>
+        <mc:Fallback xmlns="">
           <p:pic>
             <p:nvPicPr>
               <p:cNvPr id="61" name="Ink 60">
@@ -11328,8 +11328,8 @@
           </p:pic>
         </mc:Fallback>
       </mc:AlternateContent>
-      <mc:AlternateContent xmlns:mc="http://schemas.openxmlformats.org/markup-compatibility/2006">
-        <mc:Choice xmlns:p14="http://schemas.microsoft.com/office/powerpoint/2010/main" Requires="p14">
+      <mc:AlternateContent xmlns:mc="http://schemas.openxmlformats.org/markup-compatibility/2006" xmlns:p14="http://schemas.microsoft.com/office/powerpoint/2010/main">
+        <mc:Choice Requires="p14">
           <p:contentPart p14:bwMode="auto" r:id="rId22">
             <p14:nvContentPartPr>
               <p14:cNvPr id="8" name="Ink 7">
@@ -11348,7 +11348,7 @@
             </p14:xfrm>
           </p:contentPart>
         </mc:Choice>
-        <mc:Fallback>
+        <mc:Fallback xmlns="">
           <p:pic>
             <p:nvPicPr>
               <p:cNvPr id="8" name="Ink 7">
@@ -11379,8 +11379,8 @@
           </p:pic>
         </mc:Fallback>
       </mc:AlternateContent>
-      <mc:AlternateContent xmlns:mc="http://schemas.openxmlformats.org/markup-compatibility/2006">
-        <mc:Choice xmlns:p14="http://schemas.microsoft.com/office/powerpoint/2010/main" Requires="p14">
+      <mc:AlternateContent xmlns:mc="http://schemas.openxmlformats.org/markup-compatibility/2006" xmlns:p14="http://schemas.microsoft.com/office/powerpoint/2010/main">
+        <mc:Choice Requires="p14">
           <p:contentPart p14:bwMode="auto" r:id="rId24">
             <p14:nvContentPartPr>
               <p14:cNvPr id="11" name="Ink 10">
@@ -11399,7 +11399,7 @@
             </p14:xfrm>
           </p:contentPart>
         </mc:Choice>
-        <mc:Fallback>
+        <mc:Fallback xmlns="">
           <p:pic>
             <p:nvPicPr>
               <p:cNvPr id="11" name="Ink 10">
@@ -11481,8 +11481,8 @@
           </p:pic>
         </mc:Fallback>
       </mc:AlternateContent>
-      <mc:AlternateContent xmlns:mc="http://schemas.openxmlformats.org/markup-compatibility/2006">
-        <mc:Choice xmlns:p14="http://schemas.microsoft.com/office/powerpoint/2010/main" Requires="p14">
+      <mc:AlternateContent xmlns:mc="http://schemas.openxmlformats.org/markup-compatibility/2006" xmlns:p14="http://schemas.microsoft.com/office/powerpoint/2010/main">
+        <mc:Choice Requires="p14">
           <p:contentPart p14:bwMode="auto" r:id="rId28">
             <p14:nvContentPartPr>
               <p14:cNvPr id="13" name="Ink 12">
@@ -11501,7 +11501,7 @@
             </p14:xfrm>
           </p:contentPart>
         </mc:Choice>
-        <mc:Fallback>
+        <mc:Fallback xmlns="">
           <p:pic>
             <p:nvPicPr>
               <p:cNvPr id="13" name="Ink 12">
@@ -11532,8 +11532,8 @@
           </p:pic>
         </mc:Fallback>
       </mc:AlternateContent>
-      <mc:AlternateContent xmlns:mc="http://schemas.openxmlformats.org/markup-compatibility/2006">
-        <mc:Choice xmlns:p14="http://schemas.microsoft.com/office/powerpoint/2010/main" Requires="p14">
+      <mc:AlternateContent xmlns:mc="http://schemas.openxmlformats.org/markup-compatibility/2006" xmlns:p14="http://schemas.microsoft.com/office/powerpoint/2010/main">
+        <mc:Choice Requires="p14">
           <p:contentPart p14:bwMode="auto" r:id="rId30">
             <p14:nvContentPartPr>
               <p14:cNvPr id="62" name="Ink 61">
@@ -11552,7 +11552,7 @@
             </p14:xfrm>
           </p:contentPart>
         </mc:Choice>
-        <mc:Fallback>
+        <mc:Fallback xmlns="">
           <p:pic>
             <p:nvPicPr>
               <p:cNvPr id="62" name="Ink 61">
@@ -11981,8 +11981,8 @@
           </p:pic>
         </mc:Fallback>
       </mc:AlternateContent>
-      <mc:AlternateContent xmlns:mc="http://schemas.openxmlformats.org/markup-compatibility/2006">
-        <mc:Choice xmlns:p14="http://schemas.microsoft.com/office/powerpoint/2010/main" Requires="p14">
+      <mc:AlternateContent xmlns:mc="http://schemas.openxmlformats.org/markup-compatibility/2006" xmlns:p14="http://schemas.microsoft.com/office/powerpoint/2010/main">
+        <mc:Choice Requires="p14">
           <p:contentPart p14:bwMode="auto" r:id="rId43">
             <p14:nvContentPartPr>
               <p14:cNvPr id="59" name="Ink 58">
@@ -12001,7 +12001,7 @@
             </p14:xfrm>
           </p:contentPart>
         </mc:Choice>
-        <mc:Fallback>
+        <mc:Fallback xmlns="">
           <p:pic>
             <p:nvPicPr>
               <p:cNvPr id="59" name="Ink 58">
@@ -12032,8 +12032,8 @@
           </p:pic>
         </mc:Fallback>
       </mc:AlternateContent>
-      <mc:AlternateContent xmlns:mc="http://schemas.openxmlformats.org/markup-compatibility/2006">
-        <mc:Choice xmlns:p14="http://schemas.microsoft.com/office/powerpoint/2010/main" Requires="p14">
+      <mc:AlternateContent xmlns:mc="http://schemas.openxmlformats.org/markup-compatibility/2006" xmlns:p14="http://schemas.microsoft.com/office/powerpoint/2010/main">
+        <mc:Choice Requires="p14">
           <p:contentPart p14:bwMode="auto" r:id="rId44">
             <p14:nvContentPartPr>
               <p14:cNvPr id="64" name="Ink 63">
@@ -12052,7 +12052,7 @@
             </p14:xfrm>
           </p:contentPart>
         </mc:Choice>
-        <mc:Fallback>
+        <mc:Fallback xmlns="">
           <p:pic>
             <p:nvPicPr>
               <p:cNvPr id="64" name="Ink 63">
@@ -12083,8 +12083,8 @@
           </p:pic>
         </mc:Fallback>
       </mc:AlternateContent>
-      <mc:AlternateContent xmlns:mc="http://schemas.openxmlformats.org/markup-compatibility/2006">
-        <mc:Choice xmlns:p14="http://schemas.microsoft.com/office/powerpoint/2010/main" Requires="p14">
+      <mc:AlternateContent xmlns:mc="http://schemas.openxmlformats.org/markup-compatibility/2006" xmlns:p14="http://schemas.microsoft.com/office/powerpoint/2010/main">
+        <mc:Choice Requires="p14">
           <p:contentPart p14:bwMode="auto" r:id="rId45">
             <p14:nvContentPartPr>
               <p14:cNvPr id="66" name="Ink 65">
@@ -12103,7 +12103,7 @@
             </p14:xfrm>
           </p:contentPart>
         </mc:Choice>
-        <mc:Fallback>
+        <mc:Fallback xmlns="">
           <p:pic>
             <p:nvPicPr>
               <p:cNvPr id="66" name="Ink 65">
@@ -12134,8 +12134,8 @@
           </p:pic>
         </mc:Fallback>
       </mc:AlternateContent>
-      <mc:AlternateContent xmlns:mc="http://schemas.openxmlformats.org/markup-compatibility/2006">
-        <mc:Choice xmlns:p14="http://schemas.microsoft.com/office/powerpoint/2010/main" Requires="p14">
+      <mc:AlternateContent xmlns:mc="http://schemas.openxmlformats.org/markup-compatibility/2006" xmlns:p14="http://schemas.microsoft.com/office/powerpoint/2010/main">
+        <mc:Choice Requires="p14">
           <p:contentPart p14:bwMode="auto" r:id="rId46">
             <p14:nvContentPartPr>
               <p14:cNvPr id="68" name="Ink 67">
@@ -12154,7 +12154,7 @@
             </p14:xfrm>
           </p:contentPart>
         </mc:Choice>
-        <mc:Fallback>
+        <mc:Fallback xmlns="">
           <p:pic>
             <p:nvPicPr>
               <p:cNvPr id="68" name="Ink 67">
@@ -12215,8 +12215,8 @@
           <a:chExt cx="0" cy="0"/>
         </a:xfrm>
       </p:grpSpPr>
-      <mc:AlternateContent xmlns:mc="http://schemas.openxmlformats.org/markup-compatibility/2006">
-        <mc:Choice xmlns:p14="http://schemas.microsoft.com/office/powerpoint/2010/main" Requires="p14">
+      <mc:AlternateContent xmlns:mc="http://schemas.openxmlformats.org/markup-compatibility/2006" xmlns:p14="http://schemas.microsoft.com/office/powerpoint/2010/main">
+        <mc:Choice Requires="p14">
           <p:contentPart p14:bwMode="auto" r:id="rId2">
             <p14:nvContentPartPr>
               <p14:cNvPr id="9" name="Ink 8">
@@ -12235,7 +12235,7 @@
             </p14:xfrm>
           </p:contentPart>
         </mc:Choice>
-        <mc:Fallback>
+        <mc:Fallback xmlns="">
           <p:pic>
             <p:nvPicPr>
               <p:cNvPr id="9" name="Ink 8">
@@ -13032,8 +13032,8 @@
           </mc:Fallback>
         </mc:AlternateContent>
       </p:grpSp>
-      <mc:AlternateContent xmlns:mc="http://schemas.openxmlformats.org/markup-compatibility/2006">
-        <mc:Choice xmlns:p14="http://schemas.microsoft.com/office/powerpoint/2010/main" Requires="p14">
+      <mc:AlternateContent xmlns:mc="http://schemas.openxmlformats.org/markup-compatibility/2006" xmlns:p14="http://schemas.microsoft.com/office/powerpoint/2010/main">
+        <mc:Choice Requires="p14">
           <p:contentPart p14:bwMode="auto" r:id="rId21">
             <p14:nvContentPartPr>
               <p14:cNvPr id="8" name="Ink 7">
@@ -13052,7 +13052,7 @@
             </p14:xfrm>
           </p:contentPart>
         </mc:Choice>
-        <mc:Fallback>
+        <mc:Fallback xmlns="">
           <p:pic>
             <p:nvPicPr>
               <p:cNvPr id="8" name="Ink 7">
@@ -13083,8 +13083,8 @@
           </p:pic>
         </mc:Fallback>
       </mc:AlternateContent>
-      <mc:AlternateContent xmlns:mc="http://schemas.openxmlformats.org/markup-compatibility/2006">
-        <mc:Choice xmlns:p14="http://schemas.microsoft.com/office/powerpoint/2010/main" Requires="p14">
+      <mc:AlternateContent xmlns:mc="http://schemas.openxmlformats.org/markup-compatibility/2006" xmlns:p14="http://schemas.microsoft.com/office/powerpoint/2010/main">
+        <mc:Choice Requires="p14">
           <p:contentPart p14:bwMode="auto" r:id="rId22">
             <p14:nvContentPartPr>
               <p14:cNvPr id="11" name="Ink 10">
@@ -13103,7 +13103,7 @@
             </p14:xfrm>
           </p:contentPart>
         </mc:Choice>
-        <mc:Fallback>
+        <mc:Fallback xmlns="">
           <p:pic>
             <p:nvPicPr>
               <p:cNvPr id="11" name="Ink 10">

</xml_diff>